<commit_message>
small updates to its
Co-Authored-By: ryanoisin <ryanoisin@users.noreply.github.com>
</commit_message>
<xml_diff>
--- a/lectures/02_interrupted_time_series/its.pptx
+++ b/lectures/02_interrupted_time_series/its.pptx
@@ -296,7 +296,7 @@
             <a:fld id="{61C17900-95FA-4124-853C-9BC71B59CBE5}" type="datetime1">
               <a:rPr lang="en-GB"/>
               <a:pPr lvl="0"/>
-              <a:t>09/05/2023</a:t>
+              <a:t>10/05/2023</a:t>
             </a:fld>
             <a:endParaRPr lang="en-GB"/>
           </a:p>
@@ -685,6 +685,112 @@
 </p:notesMaster>
 </file>
 
+<file path=ppt/notesSlides/notesSlide1.xml><?xml version="1.0" encoding="utf-8"?>
+<p:notes xmlns:a="http://schemas.openxmlformats.org/drawingml/2006/main" xmlns:r="http://schemas.openxmlformats.org/officeDocument/2006/relationships" xmlns:p="http://schemas.openxmlformats.org/presentationml/2006/main">
+  <p:cSld>
+    <p:spTree>
+      <p:nvGrpSpPr>
+        <p:cNvPr id="1" name=""/>
+        <p:cNvGrpSpPr/>
+        <p:nvPr/>
+      </p:nvGrpSpPr>
+      <p:grpSpPr>
+        <a:xfrm>
+          <a:off x="0" y="0"/>
+          <a:ext cx="0" cy="0"/>
+          <a:chOff x="0" y="0"/>
+          <a:chExt cx="0" cy="0"/>
+        </a:xfrm>
+      </p:grpSpPr>
+      <p:sp>
+        <p:nvSpPr>
+          <p:cNvPr id="2" name="Slide Image Placeholder 1"/>
+          <p:cNvSpPr>
+            <a:spLocks noGrp="1" noRot="1" noChangeAspect="1"/>
+          </p:cNvSpPr>
+          <p:nvPr>
+            <p:ph type="sldImg"/>
+          </p:nvPr>
+        </p:nvSpPr>
+        <p:spPr>
+          <a:xfrm>
+            <a:off x="685800" y="1143000"/>
+            <a:ext cx="5486400" cy="3086100"/>
+          </a:xfrm>
+        </p:spPr>
+      </p:sp>
+      <p:sp>
+        <p:nvSpPr>
+          <p:cNvPr id="3" name="Notes Placeholder 2"/>
+          <p:cNvSpPr>
+            <a:spLocks noGrp="1"/>
+          </p:cNvSpPr>
+          <p:nvPr>
+            <p:ph type="body" idx="1"/>
+          </p:nvPr>
+        </p:nvSpPr>
+        <p:spPr/>
+        <p:txBody>
+          <a:bodyPr/>
+          <a:lstStyle/>
+          <a:p>
+            <a:r>
+              <a:rPr lang="en-US" dirty="0"/>
+              <a:t>Notes; fuzzy regression discontinuity, check slides of Andrew </a:t>
+            </a:r>
+            <a:r>
+              <a:rPr lang="en-US" dirty="0" err="1"/>
+              <a:t>heiss</a:t>
+            </a:r>
+            <a:r>
+              <a:rPr lang="en-US" dirty="0"/>
+              <a:t> (sometimes you don’t have a single time </a:t>
+            </a:r>
+            <a:r>
+              <a:rPr lang="en-US"/>
+              <a:t>point etc.)</a:t>
+            </a:r>
+            <a:endParaRPr lang="en-NL"/>
+          </a:p>
+        </p:txBody>
+      </p:sp>
+      <p:sp>
+        <p:nvSpPr>
+          <p:cNvPr id="4" name="Slide Number Placeholder 3"/>
+          <p:cNvSpPr>
+            <a:spLocks noGrp="1"/>
+          </p:cNvSpPr>
+          <p:nvPr>
+            <p:ph type="sldNum" sz="quarter" idx="5"/>
+          </p:nvPr>
+        </p:nvSpPr>
+        <p:spPr/>
+        <p:txBody>
+          <a:bodyPr/>
+          <a:lstStyle/>
+          <a:p>
+            <a:pPr lvl="0"/>
+            <a:fld id="{8E8F8CAC-A6C2-44BD-8532-85D68FCA9A10}" type="slidenum">
+              <a:rPr lang="en-NL" smtClean="0"/>
+              <a:t>20</a:t>
+            </a:fld>
+            <a:endParaRPr lang="en-NL"/>
+          </a:p>
+        </p:txBody>
+      </p:sp>
+    </p:spTree>
+    <p:extLst>
+      <p:ext uri="{BB962C8B-B14F-4D97-AF65-F5344CB8AC3E}">
+        <p14:creationId xmlns:p14="http://schemas.microsoft.com/office/powerpoint/2010/main" val="3222123148"/>
+      </p:ext>
+    </p:extLst>
+  </p:cSld>
+  <p:clrMapOvr>
+    <a:masterClrMapping/>
+  </p:clrMapOvr>
+</p:notes>
+</file>
+
 <file path=ppt/slideLayouts/slideLayout1.xml><?xml version="1.0" encoding="utf-8"?>
 <p:sldLayout xmlns:a="http://schemas.openxmlformats.org/drawingml/2006/main" xmlns:r="http://schemas.openxmlformats.org/officeDocument/2006/relationships" xmlns:p="http://schemas.openxmlformats.org/presentationml/2006/main" type="title" preserve="1">
   <p:cSld name="Title Slide">
@@ -810,7 +916,7 @@
             <a:fld id="{4A25D1A3-0A93-4C94-80FF-26B8FD61124B}" type="datetime1">
               <a:rPr lang="en-GB"/>
               <a:pPr lvl="0"/>
-              <a:t>09/05/2023</a:t>
+              <a:t>10/05/2023</a:t>
             </a:fld>
             <a:endParaRPr lang="en-GB"/>
           </a:p>
@@ -1047,7 +1153,7 @@
             <a:fld id="{81142B93-5A2B-450B-8B37-47C337A7F461}" type="datetime1">
               <a:rPr lang="en-GB"/>
               <a:pPr lvl="0"/>
-              <a:t>09/05/2023</a:t>
+              <a:t>10/05/2023</a:t>
             </a:fld>
             <a:endParaRPr lang="en-GB"/>
           </a:p>
@@ -1293,7 +1399,7 @@
             <a:fld id="{6E063067-B603-41EE-A9A7-41899DD775E6}" type="datetime1">
               <a:rPr lang="en-GB"/>
               <a:pPr lvl="0"/>
-              <a:t>09/05/2023</a:t>
+              <a:t>10/05/2023</a:t>
             </a:fld>
             <a:endParaRPr lang="en-GB"/>
           </a:p>
@@ -1529,7 +1635,7 @@
             <a:fld id="{6F249873-F8C6-4397-84F9-F8EC0F22A697}" type="datetime1">
               <a:rPr lang="en-GB"/>
               <a:pPr lvl="0"/>
-              <a:t>09/05/2023</a:t>
+              <a:t>10/05/2023</a:t>
             </a:fld>
             <a:endParaRPr lang="en-GB"/>
           </a:p>
@@ -1740,7 +1846,7 @@
             <a:fld id="{C12BD4ED-6206-4BF6-96F8-E25353DC0FB4}" type="datetime1">
               <a:rPr lang="en-GB"/>
               <a:pPr lvl="0"/>
-              <a:t>09/05/2023</a:t>
+              <a:t>10/05/2023</a:t>
             </a:fld>
             <a:endParaRPr lang="en-GB"/>
           </a:p>
@@ -2060,7 +2166,7 @@
             <a:fld id="{39B86B4E-481C-4780-B006-4B46E923812F}" type="datetime1">
               <a:rPr lang="en-GB"/>
               <a:pPr lvl="0"/>
-              <a:t>09/05/2023</a:t>
+              <a:t>10/05/2023</a:t>
             </a:fld>
             <a:endParaRPr lang="en-GB"/>
           </a:p>
@@ -2463,7 +2569,7 @@
             <a:fld id="{4D4B0C8B-6A6B-4F9A-AD92-C7A874294C43}" type="datetime1">
               <a:rPr lang="en-GB"/>
               <a:pPr lvl="0"/>
-              <a:t>09/05/2023</a:t>
+              <a:t>10/05/2023</a:t>
             </a:fld>
             <a:endParaRPr lang="en-GB"/>
           </a:p>
@@ -2625,7 +2731,7 @@
             <a:fld id="{2242089C-BC90-4A09-BBF2-11ACCFCC6AAC}" type="datetime1">
               <a:rPr lang="en-GB"/>
               <a:pPr lvl="0"/>
-              <a:t>09/05/2023</a:t>
+              <a:t>10/05/2023</a:t>
             </a:fld>
             <a:endParaRPr lang="en-GB"/>
           </a:p>
@@ -2753,7 +2859,7 @@
             <a:fld id="{9E45A0C3-C9A4-409A-ABC1-542A7544900D}" type="datetime1">
               <a:rPr lang="en-GB"/>
               <a:pPr lvl="0"/>
-              <a:t>09/05/2023</a:t>
+              <a:t>10/05/2023</a:t>
             </a:fld>
             <a:endParaRPr lang="en-GB"/>
           </a:p>
@@ -3038,7 +3144,7 @@
             <a:fld id="{FE905373-3B96-430D-80BE-EEB6F3514509}" type="datetime1">
               <a:rPr lang="en-GB"/>
               <a:pPr lvl="0"/>
-              <a:t>09/05/2023</a:t>
+              <a:t>10/05/2023</a:t>
             </a:fld>
             <a:endParaRPr lang="en-GB"/>
           </a:p>
@@ -3280,7 +3386,7 @@
             <a:fld id="{FD713A6C-3BFD-4C18-89E6-78D595B19DB8}" type="datetime1">
               <a:rPr lang="en-GB"/>
               <a:pPr lvl="0"/>
-              <a:t>09/05/2023</a:t>
+              <a:t>10/05/2023</a:t>
             </a:fld>
             <a:endParaRPr lang="en-GB"/>
           </a:p>
@@ -3563,7 +3669,7 @@
             <a:fld id="{19E4415A-9E33-406F-911E-8770DEE3AE96}" type="datetime1">
               <a:rPr lang="en-GB"/>
               <a:pPr lvl="0"/>
-              <a:t>09/05/2023</a:t>
+              <a:t>10/05/2023</a:t>
             </a:fld>
             <a:endParaRPr lang="en-GB"/>
           </a:p>
@@ -4190,8 +4296,8 @@
           </a:p>
         </p:txBody>
       </p:sp>
-      <mc:AlternateContent xmlns:mc="http://schemas.openxmlformats.org/markup-compatibility/2006">
-        <mc:Choice xmlns:a14="http://schemas.microsoft.com/office/drawing/2010/main" Requires="a14">
+      <mc:AlternateContent xmlns:mc="http://schemas.openxmlformats.org/markup-compatibility/2006" xmlns:a14="http://schemas.microsoft.com/office/drawing/2010/main">
+        <mc:Choice Requires="a14">
           <p:sp>
             <p:nvSpPr>
               <p:cNvPr id="3" name="Content Placeholder 2">
@@ -4956,7 +5062,7 @@
             </p:txBody>
           </p:sp>
         </mc:Choice>
-        <mc:Fallback>
+        <mc:Fallback xmlns="">
           <p:sp>
             <p:nvSpPr>
               <p:cNvPr id="3" name="Content Placeholder 2">
@@ -5030,8 +5136,8 @@
           <a:chExt cx="0" cy="0"/>
         </a:xfrm>
       </p:grpSpPr>
-      <mc:AlternateContent xmlns:mc="http://schemas.openxmlformats.org/markup-compatibility/2006">
-        <mc:Choice xmlns:a14="http://schemas.microsoft.com/office/drawing/2010/main" Requires="a14">
+      <mc:AlternateContent xmlns:mc="http://schemas.openxmlformats.org/markup-compatibility/2006" xmlns:a14="http://schemas.microsoft.com/office/drawing/2010/main">
+        <mc:Choice Requires="a14">
           <p:graphicFrame>
             <p:nvGraphicFramePr>
               <p:cNvPr id="3" name="Table 6">
@@ -7383,7 +7489,7 @@
             </a:graphic>
           </p:graphicFrame>
         </mc:Choice>
-        <mc:Fallback>
+        <mc:Fallback xmlns="">
           <p:graphicFrame>
             <p:nvGraphicFramePr>
               <p:cNvPr id="3" name="Table 6">
@@ -8918,8 +9024,8 @@
           </a:p>
         </p:txBody>
       </p:sp>
-      <mc:AlternateContent xmlns:mc="http://schemas.openxmlformats.org/markup-compatibility/2006">
-        <mc:Choice xmlns:a14="http://schemas.microsoft.com/office/drawing/2010/main" Requires="a14">
+      <mc:AlternateContent xmlns:mc="http://schemas.openxmlformats.org/markup-compatibility/2006" xmlns:a14="http://schemas.microsoft.com/office/drawing/2010/main">
+        <mc:Choice Requires="a14">
           <p:sp>
             <p:nvSpPr>
               <p:cNvPr id="9" name="TextBox 8">
@@ -9220,7 +9326,7 @@
             </p:txBody>
           </p:sp>
         </mc:Choice>
-        <mc:Fallback>
+        <mc:Fallback xmlns="">
           <p:sp>
             <p:nvSpPr>
               <p:cNvPr id="9" name="TextBox 8">
@@ -9385,8 +9491,8 @@
           </a:fontRef>
         </p:style>
       </p:cxnSp>
-      <mc:AlternateContent xmlns:mc="http://schemas.openxmlformats.org/markup-compatibility/2006">
-        <mc:Choice xmlns:a14="http://schemas.microsoft.com/office/drawing/2010/main" Requires="a14">
+      <mc:AlternateContent xmlns:mc="http://schemas.openxmlformats.org/markup-compatibility/2006" xmlns:a14="http://schemas.microsoft.com/office/drawing/2010/main">
+        <mc:Choice Requires="a14">
           <p:graphicFrame>
             <p:nvGraphicFramePr>
               <p:cNvPr id="3" name="Table 6">
@@ -11732,7 +11838,7 @@
             </a:graphic>
           </p:graphicFrame>
         </mc:Choice>
-        <mc:Fallback>
+        <mc:Fallback xmlns="">
           <p:graphicFrame>
             <p:nvGraphicFramePr>
               <p:cNvPr id="3" name="Table 6">
@@ -13261,8 +13367,8 @@
           </a:p>
         </p:txBody>
       </p:sp>
-      <mc:AlternateContent xmlns:mc="http://schemas.openxmlformats.org/markup-compatibility/2006">
-        <mc:Choice xmlns:a14="http://schemas.microsoft.com/office/drawing/2010/main" Requires="a14">
+      <mc:AlternateContent xmlns:mc="http://schemas.openxmlformats.org/markup-compatibility/2006" xmlns:a14="http://schemas.microsoft.com/office/drawing/2010/main">
+        <mc:Choice Requires="a14">
           <p:sp>
             <p:nvSpPr>
               <p:cNvPr id="9" name="TextBox 8">
@@ -13563,7 +13669,7 @@
             </p:txBody>
           </p:sp>
         </mc:Choice>
-        <mc:Fallback>
+        <mc:Fallback xmlns="">
           <p:sp>
             <p:nvSpPr>
               <p:cNvPr id="9" name="TextBox 8">
@@ -13772,8 +13878,8 @@
           </a:fontRef>
         </p:style>
       </p:cxnSp>
-      <mc:AlternateContent xmlns:mc="http://schemas.openxmlformats.org/markup-compatibility/2006">
-        <mc:Choice xmlns:a14="http://schemas.microsoft.com/office/drawing/2010/main" Requires="a14">
+      <mc:AlternateContent xmlns:mc="http://schemas.openxmlformats.org/markup-compatibility/2006" xmlns:a14="http://schemas.microsoft.com/office/drawing/2010/main">
+        <mc:Choice Requires="a14">
           <p:graphicFrame>
             <p:nvGraphicFramePr>
               <p:cNvPr id="3" name="Table 6">
@@ -16119,7 +16225,7 @@
             </a:graphic>
           </p:graphicFrame>
         </mc:Choice>
-        <mc:Fallback>
+        <mc:Fallback xmlns="">
           <p:graphicFrame>
             <p:nvGraphicFramePr>
               <p:cNvPr id="3" name="Table 6">
@@ -17648,8 +17754,8 @@
           </a:p>
         </p:txBody>
       </p:sp>
-      <mc:AlternateContent xmlns:mc="http://schemas.openxmlformats.org/markup-compatibility/2006">
-        <mc:Choice xmlns:a14="http://schemas.microsoft.com/office/drawing/2010/main" Requires="a14">
+      <mc:AlternateContent xmlns:mc="http://schemas.openxmlformats.org/markup-compatibility/2006" xmlns:a14="http://schemas.microsoft.com/office/drawing/2010/main">
+        <mc:Choice Requires="a14">
           <p:sp>
             <p:nvSpPr>
               <p:cNvPr id="9" name="TextBox 8">
@@ -17950,7 +18056,7 @@
             </p:txBody>
           </p:sp>
         </mc:Choice>
-        <mc:Fallback>
+        <mc:Fallback xmlns="">
           <p:sp>
             <p:nvSpPr>
               <p:cNvPr id="9" name="TextBox 8">
@@ -18159,8 +18265,8 @@
           </a:fontRef>
         </p:style>
       </p:cxnSp>
-      <mc:AlternateContent xmlns:mc="http://schemas.openxmlformats.org/markup-compatibility/2006">
-        <mc:Choice xmlns:a14="http://schemas.microsoft.com/office/drawing/2010/main" Requires="a14">
+      <mc:AlternateContent xmlns:mc="http://schemas.openxmlformats.org/markup-compatibility/2006" xmlns:a14="http://schemas.microsoft.com/office/drawing/2010/main">
+        <mc:Choice Requires="a14">
           <p:graphicFrame>
             <p:nvGraphicFramePr>
               <p:cNvPr id="3" name="Table 6">
@@ -20506,7 +20612,7 @@
             </a:graphic>
           </p:graphicFrame>
         </mc:Choice>
-        <mc:Fallback>
+        <mc:Fallback xmlns="">
           <p:graphicFrame>
             <p:nvGraphicFramePr>
               <p:cNvPr id="3" name="Table 6">
@@ -22035,8 +22141,8 @@
           </a:p>
         </p:txBody>
       </p:sp>
-      <mc:AlternateContent xmlns:mc="http://schemas.openxmlformats.org/markup-compatibility/2006">
-        <mc:Choice xmlns:a14="http://schemas.microsoft.com/office/drawing/2010/main" Requires="a14">
+      <mc:AlternateContent xmlns:mc="http://schemas.openxmlformats.org/markup-compatibility/2006" xmlns:a14="http://schemas.microsoft.com/office/drawing/2010/main">
+        <mc:Choice Requires="a14">
           <p:sp>
             <p:nvSpPr>
               <p:cNvPr id="9" name="TextBox 8">
@@ -22337,7 +22443,7 @@
             </p:txBody>
           </p:sp>
         </mc:Choice>
-        <mc:Fallback>
+        <mc:Fallback xmlns="">
           <p:sp>
             <p:nvSpPr>
               <p:cNvPr id="9" name="TextBox 8">
@@ -22471,8 +22577,8 @@
           </a:p>
         </p:txBody>
       </p:sp>
-      <mc:AlternateContent xmlns:mc="http://schemas.openxmlformats.org/markup-compatibility/2006">
-        <mc:Choice xmlns:a14="http://schemas.microsoft.com/office/drawing/2010/main" Requires="a14">
+      <mc:AlternateContent xmlns:mc="http://schemas.openxmlformats.org/markup-compatibility/2006" xmlns:a14="http://schemas.microsoft.com/office/drawing/2010/main">
+        <mc:Choice Requires="a14">
           <p:sp>
             <p:nvSpPr>
               <p:cNvPr id="11" name="TextBox 10">
@@ -22722,7 +22828,7 @@
             </p:txBody>
           </p:sp>
         </mc:Choice>
-        <mc:Fallback>
+        <mc:Fallback xmlns="">
           <p:sp>
             <p:nvSpPr>
               <p:cNvPr id="11" name="TextBox 10">
@@ -23081,8 +23187,8 @@
           </a:p>
         </p:txBody>
       </p:sp>
-      <mc:AlternateContent xmlns:mc="http://schemas.openxmlformats.org/markup-compatibility/2006">
-        <mc:Choice xmlns:a14="http://schemas.microsoft.com/office/drawing/2010/main" Requires="a14">
+      <mc:AlternateContent xmlns:mc="http://schemas.openxmlformats.org/markup-compatibility/2006" xmlns:a14="http://schemas.microsoft.com/office/drawing/2010/main">
+        <mc:Choice Requires="a14">
           <p:sp>
             <p:nvSpPr>
               <p:cNvPr id="4" name="TextBox 3">
@@ -23320,7 +23426,7 @@
             </p:txBody>
           </p:sp>
         </mc:Choice>
-        <mc:Fallback>
+        <mc:Fallback xmlns="">
           <p:sp>
             <p:nvSpPr>
               <p:cNvPr id="4" name="TextBox 3">
@@ -23365,8 +23471,8 @@
           </p:sp>
         </mc:Fallback>
       </mc:AlternateContent>
-      <mc:AlternateContent xmlns:mc="http://schemas.openxmlformats.org/markup-compatibility/2006">
-        <mc:Choice xmlns:a14="http://schemas.microsoft.com/office/drawing/2010/main" Requires="a14">
+      <mc:AlternateContent xmlns:mc="http://schemas.openxmlformats.org/markup-compatibility/2006" xmlns:a14="http://schemas.microsoft.com/office/drawing/2010/main">
+        <mc:Choice Requires="a14">
           <p:sp>
             <p:nvSpPr>
               <p:cNvPr id="5" name="TextBox 4">
@@ -23586,7 +23692,7 @@
             </p:txBody>
           </p:sp>
         </mc:Choice>
-        <mc:Fallback>
+        <mc:Fallback xmlns="">
           <p:sp>
             <p:nvSpPr>
               <p:cNvPr id="5" name="TextBox 4">
@@ -23631,8 +23737,8 @@
           </p:sp>
         </mc:Fallback>
       </mc:AlternateContent>
-      <mc:AlternateContent xmlns:mc="http://schemas.openxmlformats.org/markup-compatibility/2006">
-        <mc:Choice xmlns:a14="http://schemas.microsoft.com/office/drawing/2010/main" Requires="a14">
+      <mc:AlternateContent xmlns:mc="http://schemas.openxmlformats.org/markup-compatibility/2006" xmlns:a14="http://schemas.microsoft.com/office/drawing/2010/main">
+        <mc:Choice Requires="a14">
           <p:sp>
             <p:nvSpPr>
               <p:cNvPr id="6" name="TextBox 5">
@@ -23938,7 +24044,7 @@
             </p:txBody>
           </p:sp>
         </mc:Choice>
-        <mc:Fallback>
+        <mc:Fallback xmlns="">
           <p:sp>
             <p:nvSpPr>
               <p:cNvPr id="6" name="TextBox 5">
@@ -23983,8 +24089,8 @@
           </p:sp>
         </mc:Fallback>
       </mc:AlternateContent>
-      <mc:AlternateContent xmlns:mc="http://schemas.openxmlformats.org/markup-compatibility/2006">
-        <mc:Choice xmlns:a14="http://schemas.microsoft.com/office/drawing/2010/main" Requires="a14">
+      <mc:AlternateContent xmlns:mc="http://schemas.openxmlformats.org/markup-compatibility/2006" xmlns:a14="http://schemas.microsoft.com/office/drawing/2010/main">
+        <mc:Choice Requires="a14">
           <p:sp>
             <p:nvSpPr>
               <p:cNvPr id="7" name="TextBox 6">
@@ -24231,7 +24337,7 @@
             </p:txBody>
           </p:sp>
         </mc:Choice>
-        <mc:Fallback>
+        <mc:Fallback xmlns="">
           <p:sp>
             <p:nvSpPr>
               <p:cNvPr id="7" name="TextBox 6">
@@ -24478,8 +24584,8 @@
           </a:p>
         </p:txBody>
       </p:sp>
-      <mc:AlternateContent xmlns:mc="http://schemas.openxmlformats.org/markup-compatibility/2006">
-        <mc:Choice xmlns:a14="http://schemas.microsoft.com/office/drawing/2010/main" Requires="a14">
+      <mc:AlternateContent xmlns:mc="http://schemas.openxmlformats.org/markup-compatibility/2006" xmlns:a14="http://schemas.microsoft.com/office/drawing/2010/main">
+        <mc:Choice Requires="a14">
           <p:sp>
             <p:nvSpPr>
               <p:cNvPr id="3" name="Content Placeholder 2">
@@ -24834,7 +24940,7 @@
             </p:txBody>
           </p:sp>
         </mc:Choice>
-        <mc:Fallback>
+        <mc:Fallback xmlns="">
           <p:sp>
             <p:nvSpPr>
               <p:cNvPr id="3" name="Content Placeholder 2">
@@ -25550,8 +25656,8 @@
           </a:p>
         </p:txBody>
       </p:sp>
-      <mc:AlternateContent xmlns:mc="http://schemas.openxmlformats.org/markup-compatibility/2006">
-        <mc:Choice xmlns:a14="http://schemas.microsoft.com/office/drawing/2010/main" Requires="a14">
+      <mc:AlternateContent xmlns:mc="http://schemas.openxmlformats.org/markup-compatibility/2006" xmlns:a14="http://schemas.microsoft.com/office/drawing/2010/main">
+        <mc:Choice Requires="a14">
           <p:sp>
             <p:nvSpPr>
               <p:cNvPr id="3" name="Content Placeholder 2">
@@ -25748,7 +25854,7 @@
             </p:txBody>
           </p:sp>
         </mc:Choice>
-        <mc:Fallback>
+        <mc:Fallback xmlns="">
           <p:sp>
             <p:nvSpPr>
               <p:cNvPr id="3" name="Content Placeholder 2">
@@ -25792,8 +25898,8 @@
           </p:sp>
         </mc:Fallback>
       </mc:AlternateContent>
-      <mc:AlternateContent xmlns:mc="http://schemas.openxmlformats.org/markup-compatibility/2006">
-        <mc:Choice xmlns:a14="http://schemas.microsoft.com/office/drawing/2010/main" Requires="a14">
+      <mc:AlternateContent xmlns:mc="http://schemas.openxmlformats.org/markup-compatibility/2006" xmlns:a14="http://schemas.microsoft.com/office/drawing/2010/main">
+        <mc:Choice Requires="a14">
           <p:sp>
             <p:nvSpPr>
               <p:cNvPr id="4" name="TextBox 3">
@@ -26162,7 +26268,7 @@
             </p:txBody>
           </p:sp>
         </mc:Choice>
-        <mc:Fallback>
+        <mc:Fallback xmlns="">
           <p:sp>
             <p:nvSpPr>
               <p:cNvPr id="4" name="TextBox 3">
@@ -29732,8 +29838,8 @@
           </a:p>
         </p:txBody>
       </p:sp>
-      <mc:AlternateContent xmlns:mc="http://schemas.openxmlformats.org/markup-compatibility/2006">
-        <mc:Choice xmlns:a14="http://schemas.microsoft.com/office/drawing/2010/main" Requires="a14">
+      <mc:AlternateContent xmlns:mc="http://schemas.openxmlformats.org/markup-compatibility/2006" xmlns:a14="http://schemas.microsoft.com/office/drawing/2010/main">
+        <mc:Choice Requires="a14">
           <p:sp>
             <p:nvSpPr>
               <p:cNvPr id="3" name="Content Placeholder 2">
@@ -30357,7 +30463,7 @@
             </p:txBody>
           </p:sp>
         </mc:Choice>
-        <mc:Fallback>
+        <mc:Fallback xmlns="">
           <p:sp>
             <p:nvSpPr>
               <p:cNvPr id="3" name="Content Placeholder 2">
@@ -30431,8 +30537,8 @@
           <a:chExt cx="0" cy="0"/>
         </a:xfrm>
       </p:grpSpPr>
-      <mc:AlternateContent xmlns:mc="http://schemas.openxmlformats.org/markup-compatibility/2006">
-        <mc:Choice xmlns:a14="http://schemas.microsoft.com/office/drawing/2010/main" Requires="a14">
+      <mc:AlternateContent xmlns:mc="http://schemas.openxmlformats.org/markup-compatibility/2006" xmlns:a14="http://schemas.microsoft.com/office/drawing/2010/main">
+        <mc:Choice Requires="a14">
           <p:graphicFrame>
             <p:nvGraphicFramePr>
               <p:cNvPr id="3" name="Table 6">
@@ -32545,7 +32651,7 @@
             </a:graphic>
           </p:graphicFrame>
         </mc:Choice>
-        <mc:Fallback>
+        <mc:Fallback xmlns="">
           <p:graphicFrame>
             <p:nvGraphicFramePr>
               <p:cNvPr id="3" name="Table 6">
@@ -33963,8 +34069,8 @@
           <a:chExt cx="0" cy="0"/>
         </a:xfrm>
       </p:grpSpPr>
-      <mc:AlternateContent xmlns:mc="http://schemas.openxmlformats.org/markup-compatibility/2006">
-        <mc:Choice xmlns:a14="http://schemas.microsoft.com/office/drawing/2010/main" Requires="a14">
+      <mc:AlternateContent xmlns:mc="http://schemas.openxmlformats.org/markup-compatibility/2006" xmlns:a14="http://schemas.microsoft.com/office/drawing/2010/main">
+        <mc:Choice Requires="a14">
           <p:graphicFrame>
             <p:nvGraphicFramePr>
               <p:cNvPr id="3" name="Table 6">
@@ -36077,7 +36183,7 @@
             </a:graphic>
           </p:graphicFrame>
         </mc:Choice>
-        <mc:Fallback>
+        <mc:Fallback xmlns="">
           <p:graphicFrame>
             <p:nvGraphicFramePr>
               <p:cNvPr id="3" name="Table 6">
@@ -37557,8 +37663,8 @@
           </a:fontRef>
         </p:style>
       </p:cxnSp>
-      <mc:AlternateContent xmlns:mc="http://schemas.openxmlformats.org/markup-compatibility/2006">
-        <mc:Choice xmlns:a14="http://schemas.microsoft.com/office/drawing/2010/main" Requires="a14">
+      <mc:AlternateContent xmlns:mc="http://schemas.openxmlformats.org/markup-compatibility/2006" xmlns:a14="http://schemas.microsoft.com/office/drawing/2010/main">
+        <mc:Choice Requires="a14">
           <p:sp>
             <p:nvSpPr>
               <p:cNvPr id="23" name="TextBox 22">
@@ -37689,7 +37795,7 @@
             </p:txBody>
           </p:sp>
         </mc:Choice>
-        <mc:Fallback>
+        <mc:Fallback xmlns="">
           <p:sp>
             <p:nvSpPr>
               <p:cNvPr id="23" name="TextBox 22">
@@ -37734,8 +37840,8 @@
           </p:sp>
         </mc:Fallback>
       </mc:AlternateContent>
-      <mc:AlternateContent xmlns:mc="http://schemas.openxmlformats.org/markup-compatibility/2006">
-        <mc:Choice xmlns:a14="http://schemas.microsoft.com/office/drawing/2010/main" Requires="a14">
+      <mc:AlternateContent xmlns:mc="http://schemas.openxmlformats.org/markup-compatibility/2006" xmlns:a14="http://schemas.microsoft.com/office/drawing/2010/main">
+        <mc:Choice Requires="a14">
           <p:sp>
             <p:nvSpPr>
               <p:cNvPr id="25" name="TextBox 24">
@@ -37866,7 +37972,7 @@
             </p:txBody>
           </p:sp>
         </mc:Choice>
-        <mc:Fallback>
+        <mc:Fallback xmlns="">
           <p:sp>
             <p:nvSpPr>
               <p:cNvPr id="25" name="TextBox 24">
@@ -38080,8 +38186,8 @@
           <a:chExt cx="0" cy="0"/>
         </a:xfrm>
       </p:grpSpPr>
-      <mc:AlternateContent xmlns:mc="http://schemas.openxmlformats.org/markup-compatibility/2006">
-        <mc:Choice xmlns:a14="http://schemas.microsoft.com/office/drawing/2010/main" Requires="a14">
+      <mc:AlternateContent xmlns:mc="http://schemas.openxmlformats.org/markup-compatibility/2006" xmlns:a14="http://schemas.microsoft.com/office/drawing/2010/main">
+        <mc:Choice Requires="a14">
           <p:graphicFrame>
             <p:nvGraphicFramePr>
               <p:cNvPr id="3" name="Table 6">
@@ -40188,7 +40294,7 @@
             </a:graphic>
           </p:graphicFrame>
         </mc:Choice>
-        <mc:Fallback>
+        <mc:Fallback xmlns="">
           <p:graphicFrame>
             <p:nvGraphicFramePr>
               <p:cNvPr id="3" name="Table 6">
@@ -41662,8 +41768,8 @@
           </a:fontRef>
         </p:style>
       </p:cxnSp>
-      <mc:AlternateContent xmlns:mc="http://schemas.openxmlformats.org/markup-compatibility/2006">
-        <mc:Choice xmlns:a14="http://schemas.microsoft.com/office/drawing/2010/main" Requires="a14">
+      <mc:AlternateContent xmlns:mc="http://schemas.openxmlformats.org/markup-compatibility/2006" xmlns:a14="http://schemas.microsoft.com/office/drawing/2010/main">
+        <mc:Choice Requires="a14">
           <p:sp>
             <p:nvSpPr>
               <p:cNvPr id="23" name="TextBox 22">
@@ -41794,7 +41900,7 @@
             </p:txBody>
           </p:sp>
         </mc:Choice>
-        <mc:Fallback>
+        <mc:Fallback xmlns="">
           <p:sp>
             <p:nvSpPr>
               <p:cNvPr id="23" name="TextBox 22">
@@ -41839,8 +41945,8 @@
           </p:sp>
         </mc:Fallback>
       </mc:AlternateContent>
-      <mc:AlternateContent xmlns:mc="http://schemas.openxmlformats.org/markup-compatibility/2006">
-        <mc:Choice xmlns:a14="http://schemas.microsoft.com/office/drawing/2010/main" Requires="a14">
+      <mc:AlternateContent xmlns:mc="http://schemas.openxmlformats.org/markup-compatibility/2006" xmlns:a14="http://schemas.microsoft.com/office/drawing/2010/main">
+        <mc:Choice Requires="a14">
           <p:sp>
             <p:nvSpPr>
               <p:cNvPr id="25" name="TextBox 24">
@@ -41971,7 +42077,7 @@
             </p:txBody>
           </p:sp>
         </mc:Choice>
-        <mc:Fallback>
+        <mc:Fallback xmlns="">
           <p:sp>
             <p:nvSpPr>
               <p:cNvPr id="25" name="TextBox 24">
@@ -42298,8 +42404,8 @@
           </a:p>
         </p:txBody>
       </p:sp>
-      <mc:AlternateContent xmlns:mc="http://schemas.openxmlformats.org/markup-compatibility/2006">
-        <mc:Choice xmlns:a14="http://schemas.microsoft.com/office/drawing/2010/main" Requires="a14">
+      <mc:AlternateContent xmlns:mc="http://schemas.openxmlformats.org/markup-compatibility/2006" xmlns:a14="http://schemas.microsoft.com/office/drawing/2010/main">
+        <mc:Choice Requires="a14">
           <p:sp>
             <p:nvSpPr>
               <p:cNvPr id="15" name="TextBox 14">
@@ -42442,7 +42548,7 @@
             </p:txBody>
           </p:sp>
         </mc:Choice>
-        <mc:Fallback>
+        <mc:Fallback xmlns="">
           <p:sp>
             <p:nvSpPr>
               <p:cNvPr id="15" name="TextBox 14">
@@ -42487,8 +42593,8 @@
           </p:sp>
         </mc:Fallback>
       </mc:AlternateContent>
-      <mc:AlternateContent xmlns:mc="http://schemas.openxmlformats.org/markup-compatibility/2006">
-        <mc:Choice xmlns:a14="http://schemas.microsoft.com/office/drawing/2010/main" Requires="a14">
+      <mc:AlternateContent xmlns:mc="http://schemas.openxmlformats.org/markup-compatibility/2006" xmlns:a14="http://schemas.microsoft.com/office/drawing/2010/main">
+        <mc:Choice Requires="a14">
           <p:sp>
             <p:nvSpPr>
               <p:cNvPr id="17" name="TextBox 16">
@@ -42774,7 +42880,7 @@
             </p:txBody>
           </p:sp>
         </mc:Choice>
-        <mc:Fallback>
+        <mc:Fallback xmlns="">
           <p:sp>
             <p:nvSpPr>
               <p:cNvPr id="17" name="TextBox 16">

</xml_diff>